<commit_message>
RENAME: All folder name.
</commit_message>
<xml_diff>
--- a/Class 12/Class-12.pptx
+++ b/Class 12/Class-12.pptx
@@ -272,7 +272,7 @@
           <a:p>
             <a:fld id="{9E684155-5FC3-46F8-BF20-643B20FDFC49}" type="datetimeFigureOut">
               <a:rPr lang="en-US" smtClean="0"/>
-              <a:t>2/21/2022</a:t>
+              <a:t>2/23/2022</a:t>
             </a:fld>
             <a:endParaRPr lang="en-US"/>
           </a:p>
@@ -470,7 +470,7 @@
           <a:p>
             <a:fld id="{9E684155-5FC3-46F8-BF20-643B20FDFC49}" type="datetimeFigureOut">
               <a:rPr lang="en-US" smtClean="0"/>
-              <a:t>2/21/2022</a:t>
+              <a:t>2/23/2022</a:t>
             </a:fld>
             <a:endParaRPr lang="en-US"/>
           </a:p>
@@ -678,7 +678,7 @@
           <a:p>
             <a:fld id="{9E684155-5FC3-46F8-BF20-643B20FDFC49}" type="datetimeFigureOut">
               <a:rPr lang="en-US" smtClean="0"/>
-              <a:t>2/21/2022</a:t>
+              <a:t>2/23/2022</a:t>
             </a:fld>
             <a:endParaRPr lang="en-US"/>
           </a:p>
@@ -876,7 +876,7 @@
           <a:p>
             <a:fld id="{9E684155-5FC3-46F8-BF20-643B20FDFC49}" type="datetimeFigureOut">
               <a:rPr lang="en-US" smtClean="0"/>
-              <a:t>2/21/2022</a:t>
+              <a:t>2/23/2022</a:t>
             </a:fld>
             <a:endParaRPr lang="en-US"/>
           </a:p>
@@ -1151,7 +1151,7 @@
           <a:p>
             <a:fld id="{9E684155-5FC3-46F8-BF20-643B20FDFC49}" type="datetimeFigureOut">
               <a:rPr lang="en-US" smtClean="0"/>
-              <a:t>2/21/2022</a:t>
+              <a:t>2/23/2022</a:t>
             </a:fld>
             <a:endParaRPr lang="en-US"/>
           </a:p>
@@ -1416,7 +1416,7 @@
           <a:p>
             <a:fld id="{9E684155-5FC3-46F8-BF20-643B20FDFC49}" type="datetimeFigureOut">
               <a:rPr lang="en-US" smtClean="0"/>
-              <a:t>2/21/2022</a:t>
+              <a:t>2/23/2022</a:t>
             </a:fld>
             <a:endParaRPr lang="en-US"/>
           </a:p>
@@ -1828,7 +1828,7 @@
           <a:p>
             <a:fld id="{9E684155-5FC3-46F8-BF20-643B20FDFC49}" type="datetimeFigureOut">
               <a:rPr lang="en-US" smtClean="0"/>
-              <a:t>2/21/2022</a:t>
+              <a:t>2/23/2022</a:t>
             </a:fld>
             <a:endParaRPr lang="en-US"/>
           </a:p>
@@ -1969,7 +1969,7 @@
           <a:p>
             <a:fld id="{9E684155-5FC3-46F8-BF20-643B20FDFC49}" type="datetimeFigureOut">
               <a:rPr lang="en-US" smtClean="0"/>
-              <a:t>2/21/2022</a:t>
+              <a:t>2/23/2022</a:t>
             </a:fld>
             <a:endParaRPr lang="en-US"/>
           </a:p>
@@ -2082,7 +2082,7 @@
           <a:p>
             <a:fld id="{9E684155-5FC3-46F8-BF20-643B20FDFC49}" type="datetimeFigureOut">
               <a:rPr lang="en-US" smtClean="0"/>
-              <a:t>2/21/2022</a:t>
+              <a:t>2/23/2022</a:t>
             </a:fld>
             <a:endParaRPr lang="en-US"/>
           </a:p>
@@ -2393,7 +2393,7 @@
           <a:p>
             <a:fld id="{9E684155-5FC3-46F8-BF20-643B20FDFC49}" type="datetimeFigureOut">
               <a:rPr lang="en-US" smtClean="0"/>
-              <a:t>2/21/2022</a:t>
+              <a:t>2/23/2022</a:t>
             </a:fld>
             <a:endParaRPr lang="en-US"/>
           </a:p>
@@ -2681,7 +2681,7 @@
           <a:p>
             <a:fld id="{9E684155-5FC3-46F8-BF20-643B20FDFC49}" type="datetimeFigureOut">
               <a:rPr lang="en-US" smtClean="0"/>
-              <a:t>2/21/2022</a:t>
+              <a:t>2/23/2022</a:t>
             </a:fld>
             <a:endParaRPr lang="en-US"/>
           </a:p>
@@ -2922,7 +2922,7 @@
           <a:p>
             <a:fld id="{9E684155-5FC3-46F8-BF20-643B20FDFC49}" type="datetimeFigureOut">
               <a:rPr lang="en-US" smtClean="0"/>
-              <a:t>2/21/2022</a:t>
+              <a:t>2/23/2022</a:t>
             </a:fld>
             <a:endParaRPr lang="en-US"/>
           </a:p>
@@ -9885,7 +9885,7 @@
                 </a:solidFill>
                 <a:latin typeface="Victor Mono" panose="00000509000000000000" pitchFamily="49" charset="0"/>
               </a:rPr>
-              <a:t> // 1</a:t>
+              <a:t> // 100</a:t>
             </a:r>
             <a:endParaRPr lang="en-US" sz="1400" b="0" i="0" dirty="0">
               <a:solidFill>
@@ -11149,7 +11149,27 @@
                 <a:effectLst/>
                 <a:latin typeface="Victor Mono" panose="00000509000000000000" pitchFamily="49" charset="0"/>
               </a:rPr>
-              <a:t>($amount);</a:t>
+              <a:t>($</a:t>
+            </a:r>
+            <a:r>
+              <a:rPr lang="en-US" sz="1400" b="0" i="0" dirty="0" err="1">
+                <a:solidFill>
+                  <a:srgbClr val="0000BB"/>
+                </a:solidFill>
+                <a:effectLst/>
+                <a:latin typeface="Victor Mono" panose="00000509000000000000" pitchFamily="49" charset="0"/>
+              </a:rPr>
+              <a:t>is_valid</a:t>
+            </a:r>
+            <a:r>
+              <a:rPr lang="en-US" sz="1400" b="0" i="0" dirty="0">
+                <a:solidFill>
+                  <a:srgbClr val="0000BB"/>
+                </a:solidFill>
+                <a:effectLst/>
+                <a:latin typeface="Victor Mono" panose="00000509000000000000" pitchFamily="49" charset="0"/>
+              </a:rPr>
+              <a:t>);</a:t>
             </a:r>
             <a:endParaRPr lang="en-US" sz="1400" dirty="0">
               <a:solidFill>

</xml_diff>